<commit_message>
made a change to the presentation
</commit_message>
<xml_diff>
--- a/Documentation/NBA Analysis Presentation.pptx
+++ b/Documentation/NBA Analysis Presentation.pptx
@@ -8,10 +8,11 @@
     <p:sldId id="256" r:id="rId2"/>
     <p:sldId id="257" r:id="rId3"/>
     <p:sldId id="258" r:id="rId4"/>
-    <p:sldId id="259" r:id="rId5"/>
-    <p:sldId id="260" r:id="rId6"/>
-    <p:sldId id="261" r:id="rId7"/>
-    <p:sldId id="262" r:id="rId8"/>
+    <p:sldId id="263" r:id="rId5"/>
+    <p:sldId id="259" r:id="rId6"/>
+    <p:sldId id="260" r:id="rId7"/>
+    <p:sldId id="261" r:id="rId8"/>
+    <p:sldId id="262" r:id="rId9"/>
   </p:sldIdLst>
   <p:sldSz cx="12192000" cy="6858000"/>
   <p:notesSz cx="6858000" cy="9144000"/>
@@ -3783,6 +3784,104 @@
 <file path=ppt/slides/slide4.xml><?xml version="1.0" encoding="utf-8"?>
 <p:sld xmlns:a="http://schemas.openxmlformats.org/drawingml/2006/main" xmlns:r="http://schemas.openxmlformats.org/officeDocument/2006/relationships" xmlns:p="http://schemas.openxmlformats.org/presentationml/2006/main">
   <p:cSld>
+    <p:spTree>
+      <p:nvGrpSpPr>
+        <p:cNvPr id="1" name=""/>
+        <p:cNvGrpSpPr/>
+        <p:nvPr/>
+      </p:nvGrpSpPr>
+      <p:grpSpPr>
+        <a:xfrm>
+          <a:off x="0" y="0"/>
+          <a:ext cx="0" cy="0"/>
+          <a:chOff x="0" y="0"/>
+          <a:chExt cx="0" cy="0"/>
+        </a:xfrm>
+      </p:grpSpPr>
+      <p:sp>
+        <p:nvSpPr>
+          <p:cNvPr id="2" name="Title 1">
+            <a:extLst>
+              <a:ext uri="{FF2B5EF4-FFF2-40B4-BE49-F238E27FC236}">
+                <a16:creationId xmlns:a16="http://schemas.microsoft.com/office/drawing/2014/main" id="{31DE3E7D-D37D-C2EE-FB72-6CB42E6542F4}"/>
+              </a:ext>
+            </a:extLst>
+          </p:cNvPr>
+          <p:cNvSpPr>
+            <a:spLocks noGrp="1"/>
+          </p:cNvSpPr>
+          <p:nvPr>
+            <p:ph type="title"/>
+          </p:nvPr>
+        </p:nvSpPr>
+        <p:spPr/>
+        <p:txBody>
+          <a:bodyPr/>
+          <a:lstStyle/>
+          <a:p>
+            <a:r>
+              <a:rPr lang="en-US" dirty="0"/>
+              <a:t>React, Recharts, &amp; MUI</a:t>
+            </a:r>
+          </a:p>
+        </p:txBody>
+      </p:sp>
+      <p:sp>
+        <p:nvSpPr>
+          <p:cNvPr id="3" name="Content Placeholder 2">
+            <a:extLst>
+              <a:ext uri="{FF2B5EF4-FFF2-40B4-BE49-F238E27FC236}">
+                <a16:creationId xmlns:a16="http://schemas.microsoft.com/office/drawing/2014/main" id="{7DBF4D12-65C6-4301-6B7F-85B11D3FC6FE}"/>
+              </a:ext>
+            </a:extLst>
+          </p:cNvPr>
+          <p:cNvSpPr>
+            <a:spLocks noGrp="1"/>
+          </p:cNvSpPr>
+          <p:nvPr>
+            <p:ph idx="1"/>
+          </p:nvPr>
+        </p:nvSpPr>
+        <p:spPr/>
+        <p:txBody>
+          <a:bodyPr/>
+          <a:lstStyle/>
+          <a:p>
+            <a:r>
+              <a:rPr lang="en-US" dirty="0"/>
+              <a:t>React is a library that allows you to create components that are reusable pieces of code like buttons, videos, and graphs that you can use to build interfaces.</a:t>
+            </a:r>
+          </a:p>
+          <a:p>
+            <a:r>
+              <a:rPr lang="en-US" dirty="0"/>
+              <a:t>Recharts is a way to use Reacts library to build out graphs</a:t>
+            </a:r>
+          </a:p>
+          <a:p>
+            <a:r>
+              <a:rPr lang="en-US" dirty="0"/>
+              <a:t>Material UI is a way to get fancy looking components like buttons, dropdown menus, and tables to use in your interface.</a:t>
+            </a:r>
+          </a:p>
+        </p:txBody>
+      </p:sp>
+    </p:spTree>
+    <p:extLst>
+      <p:ext uri="{BB962C8B-B14F-4D97-AF65-F5344CB8AC3E}">
+        <p14:creationId xmlns:p14="http://schemas.microsoft.com/office/powerpoint/2010/main" val="262908803"/>
+      </p:ext>
+    </p:extLst>
+  </p:cSld>
+  <p:clrMapOvr>
+    <a:masterClrMapping/>
+  </p:clrMapOvr>
+</p:sld>
+</file>
+
+<file path=ppt/slides/slide5.xml><?xml version="1.0" encoding="utf-8"?>
+<p:sld xmlns:a="http://schemas.openxmlformats.org/drawingml/2006/main" xmlns:r="http://schemas.openxmlformats.org/officeDocument/2006/relationships" xmlns:p="http://schemas.openxmlformats.org/presentationml/2006/main">
+  <p:cSld>
     <p:bg>
       <p:bgPr>
         <a:solidFill>
@@ -3950,7 +4049,7 @@
 </p:sld>
 </file>
 
-<file path=ppt/slides/slide5.xml><?xml version="1.0" encoding="utf-8"?>
+<file path=ppt/slides/slide6.xml><?xml version="1.0" encoding="utf-8"?>
 <p:sld xmlns:a="http://schemas.openxmlformats.org/drawingml/2006/main" xmlns:r="http://schemas.openxmlformats.org/officeDocument/2006/relationships" xmlns:p="http://schemas.openxmlformats.org/presentationml/2006/main">
   <p:cSld>
     <p:bg>
@@ -4178,7 +4277,7 @@
 </p:sld>
 </file>
 
-<file path=ppt/slides/slide6.xml><?xml version="1.0" encoding="utf-8"?>
+<file path=ppt/slides/slide7.xml><?xml version="1.0" encoding="utf-8"?>
 <p:sld xmlns:a="http://schemas.openxmlformats.org/drawingml/2006/main" xmlns:r="http://schemas.openxmlformats.org/officeDocument/2006/relationships" xmlns:p="http://schemas.openxmlformats.org/presentationml/2006/main">
   <p:cSld>
     <p:bg>
@@ -4414,7 +4513,7 @@
 </p:sld>
 </file>
 
-<file path=ppt/slides/slide7.xml><?xml version="1.0" encoding="utf-8"?>
+<file path=ppt/slides/slide8.xml><?xml version="1.0" encoding="utf-8"?>
 <p:sld xmlns:a="http://schemas.openxmlformats.org/drawingml/2006/main" xmlns:r="http://schemas.openxmlformats.org/officeDocument/2006/relationships" xmlns:p="http://schemas.openxmlformats.org/presentationml/2006/main">
   <p:cSld>
     <p:spTree>

</xml_diff>

<commit_message>
added content to the presentation
</commit_message>
<xml_diff>
--- a/Documentation/NBA Analysis Presentation.pptx
+++ b/Documentation/NBA Analysis Presentation.pptx
@@ -9,10 +9,11 @@
     <p:sldId id="257" r:id="rId3"/>
     <p:sldId id="258" r:id="rId4"/>
     <p:sldId id="263" r:id="rId5"/>
-    <p:sldId id="259" r:id="rId6"/>
-    <p:sldId id="260" r:id="rId7"/>
-    <p:sldId id="261" r:id="rId8"/>
-    <p:sldId id="262" r:id="rId9"/>
+    <p:sldId id="264" r:id="rId6"/>
+    <p:sldId id="259" r:id="rId7"/>
+    <p:sldId id="260" r:id="rId8"/>
+    <p:sldId id="261" r:id="rId9"/>
+    <p:sldId id="262" r:id="rId10"/>
   </p:sldIdLst>
   <p:sldSz cx="12192000" cy="6858000"/>
   <p:notesSz cx="6858000" cy="9144000"/>
@@ -3743,7 +3744,7 @@
           <a:p>
             <a:r>
               <a:rPr lang="en-US" dirty="0"/>
-              <a:t>NBA data is publicly available</a:t>
+              <a:t>NBA data is publicly available.</a:t>
             </a:r>
           </a:p>
           <a:p>
@@ -3814,7 +3815,12 @@
             <p:ph type="title"/>
           </p:nvPr>
         </p:nvSpPr>
-        <p:spPr/>
+        <p:spPr>
+          <a:xfrm>
+            <a:off x="894837" y="2858251"/>
+            <a:ext cx="4486656" cy="1141497"/>
+          </a:xfrm>
+        </p:spPr>
         <p:txBody>
           <a:bodyPr/>
           <a:lstStyle/>
@@ -3842,7 +3848,12 @@
             <p:ph idx="1"/>
           </p:nvPr>
         </p:nvSpPr>
-        <p:spPr/>
+        <p:spPr>
+          <a:xfrm>
+            <a:off x="6810508" y="1848364"/>
+            <a:ext cx="4815840" cy="3161272"/>
+          </a:xfrm>
+        </p:spPr>
         <p:txBody>
           <a:bodyPr/>
           <a:lstStyle/>
@@ -3855,7 +3866,7 @@
           <a:p>
             <a:r>
               <a:rPr lang="en-US" dirty="0"/>
-              <a:t>Recharts is a way to use Reacts library to build out graphs</a:t>
+              <a:t>Recharts is a way to use Reacts library to build out graphs.</a:t>
             </a:r>
           </a:p>
           <a:p>
@@ -3880,6 +3891,104 @@
 </file>
 
 <file path=ppt/slides/slide5.xml><?xml version="1.0" encoding="utf-8"?>
+<p:sld xmlns:a="http://schemas.openxmlformats.org/drawingml/2006/main" xmlns:r="http://schemas.openxmlformats.org/officeDocument/2006/relationships" xmlns:p="http://schemas.openxmlformats.org/presentationml/2006/main">
+  <p:cSld>
+    <p:spTree>
+      <p:nvGrpSpPr>
+        <p:cNvPr id="1" name=""/>
+        <p:cNvGrpSpPr/>
+        <p:nvPr/>
+      </p:nvGrpSpPr>
+      <p:grpSpPr>
+        <a:xfrm>
+          <a:off x="0" y="0"/>
+          <a:ext cx="0" cy="0"/>
+          <a:chOff x="0" y="0"/>
+          <a:chExt cx="0" cy="0"/>
+        </a:xfrm>
+      </p:grpSpPr>
+      <p:sp>
+        <p:nvSpPr>
+          <p:cNvPr id="2" name="Title 1">
+            <a:extLst>
+              <a:ext uri="{FF2B5EF4-FFF2-40B4-BE49-F238E27FC236}">
+                <a16:creationId xmlns:a16="http://schemas.microsoft.com/office/drawing/2014/main" id="{06ED8CA9-DBAD-0486-6FA9-8FB688B049D2}"/>
+              </a:ext>
+            </a:extLst>
+          </p:cNvPr>
+          <p:cNvSpPr>
+            <a:spLocks noGrp="1"/>
+          </p:cNvSpPr>
+          <p:nvPr>
+            <p:ph type="title"/>
+          </p:nvPr>
+        </p:nvSpPr>
+        <p:spPr/>
+        <p:txBody>
+          <a:bodyPr/>
+          <a:lstStyle/>
+          <a:p>
+            <a:r>
+              <a:rPr lang="en-US" dirty="0"/>
+              <a:t>Data Cleaning &amp; Storage</a:t>
+            </a:r>
+          </a:p>
+        </p:txBody>
+      </p:sp>
+      <p:sp>
+        <p:nvSpPr>
+          <p:cNvPr id="3" name="Content Placeholder 2">
+            <a:extLst>
+              <a:ext uri="{FF2B5EF4-FFF2-40B4-BE49-F238E27FC236}">
+                <a16:creationId xmlns:a16="http://schemas.microsoft.com/office/drawing/2014/main" id="{217C3A63-0382-70BF-B1EB-BAF46319AAF0}"/>
+              </a:ext>
+            </a:extLst>
+          </p:cNvPr>
+          <p:cNvSpPr>
+            <a:spLocks noGrp="1"/>
+          </p:cNvSpPr>
+          <p:nvPr>
+            <p:ph idx="1"/>
+          </p:nvPr>
+        </p:nvSpPr>
+        <p:spPr/>
+        <p:txBody>
+          <a:bodyPr/>
+          <a:lstStyle/>
+          <a:p>
+            <a:r>
+              <a:rPr lang="en-US" dirty="0"/>
+              <a:t>The CSVs were imported into a Python file for cleaning.</a:t>
+            </a:r>
+          </a:p>
+          <a:p>
+            <a:r>
+              <a:rPr lang="en-US" dirty="0"/>
+              <a:t>Dropped unnecessary columns, formatted columns, etc.</a:t>
+            </a:r>
+          </a:p>
+          <a:p>
+            <a:r>
+              <a:rPr lang="en-US" dirty="0"/>
+              <a:t>Data was exported into JSONs and added into MongoDB to be stored.</a:t>
+            </a:r>
+          </a:p>
+        </p:txBody>
+      </p:sp>
+    </p:spTree>
+    <p:extLst>
+      <p:ext uri="{BB962C8B-B14F-4D97-AF65-F5344CB8AC3E}">
+        <p14:creationId xmlns:p14="http://schemas.microsoft.com/office/powerpoint/2010/main" val="18149961"/>
+      </p:ext>
+    </p:extLst>
+  </p:cSld>
+  <p:clrMapOvr>
+    <a:masterClrMapping/>
+  </p:clrMapOvr>
+</p:sld>
+</file>
+
+<file path=ppt/slides/slide6.xml><?xml version="1.0" encoding="utf-8"?>
 <p:sld xmlns:a="http://schemas.openxmlformats.org/drawingml/2006/main" xmlns:r="http://schemas.openxmlformats.org/officeDocument/2006/relationships" xmlns:p="http://schemas.openxmlformats.org/presentationml/2006/main">
   <p:cSld>
     <p:bg>
@@ -4049,7 +4158,7 @@
 </p:sld>
 </file>
 
-<file path=ppt/slides/slide6.xml><?xml version="1.0" encoding="utf-8"?>
+<file path=ppt/slides/slide7.xml><?xml version="1.0" encoding="utf-8"?>
 <p:sld xmlns:a="http://schemas.openxmlformats.org/drawingml/2006/main" xmlns:r="http://schemas.openxmlformats.org/officeDocument/2006/relationships" xmlns:p="http://schemas.openxmlformats.org/presentationml/2006/main">
   <p:cSld>
     <p:bg>
@@ -4277,7 +4386,7 @@
 </p:sld>
 </file>
 
-<file path=ppt/slides/slide7.xml><?xml version="1.0" encoding="utf-8"?>
+<file path=ppt/slides/slide8.xml><?xml version="1.0" encoding="utf-8"?>
 <p:sld xmlns:a="http://schemas.openxmlformats.org/drawingml/2006/main" xmlns:r="http://schemas.openxmlformats.org/officeDocument/2006/relationships" xmlns:p="http://schemas.openxmlformats.org/presentationml/2006/main">
   <p:cSld>
     <p:bg>
@@ -4513,7 +4622,7 @@
 </p:sld>
 </file>
 
-<file path=ppt/slides/slide8.xml><?xml version="1.0" encoding="utf-8"?>
+<file path=ppt/slides/slide9.xml><?xml version="1.0" encoding="utf-8"?>
 <p:sld xmlns:a="http://schemas.openxmlformats.org/drawingml/2006/main" xmlns:r="http://schemas.openxmlformats.org/officeDocument/2006/relationships" xmlns:p="http://schemas.openxmlformats.org/presentationml/2006/main">
   <p:cSld>
     <p:spTree>

</xml_diff>